<commit_message>
Removed delta time counter, Added to ppt
</commit_message>
<xml_diff>
--- a/Fluid simulation sandbox.pptx
+++ b/Fluid simulation sandbox.pptx
@@ -6837,8 +6837,8 @@
         </p:nvSpPr>
         <p:spPr>
           <a:xfrm>
-            <a:off x="1371600" y="2457973"/>
-            <a:ext cx="9448800" cy="3833769"/>
+            <a:off x="1371600" y="2266284"/>
+            <a:ext cx="9448800" cy="4217146"/>
           </a:xfrm>
         </p:spPr>
         <p:txBody>
@@ -6846,6 +6846,25 @@
             <a:normAutofit/>
           </a:bodyPr>
           <a:lstStyle/>
+          <a:p>
+            <a:pPr marL="342900" indent="-342900">
+              <a:buFont typeface="Arial" panose="020B0604020202020204" pitchFamily="34" charset="0"/>
+              <a:buChar char="•"/>
+            </a:pPr>
+            <a:r>
+              <a:rPr lang="nl-NL" dirty="0" err="1"/>
+              <a:t>Coarse</a:t>
+            </a:r>
+            <a:r>
+              <a:rPr lang="nl-NL" dirty="0"/>
+              <a:t> </a:t>
+            </a:r>
+            <a:r>
+              <a:rPr lang="nl-NL" dirty="0" err="1"/>
+              <a:t>grid</a:t>
+            </a:r>
+            <a:endParaRPr lang="nl-NL" dirty="0"/>
+          </a:p>
           <a:p>
             <a:pPr marL="342900" indent="-342900">
               <a:buFont typeface="Arial" panose="020B0604020202020204" pitchFamily="34" charset="0"/>
@@ -7005,7 +7024,7 @@
               <a:buFont typeface="Arial" panose="020B0604020202020204" pitchFamily="34" charset="0"/>
               <a:buChar char="•"/>
             </a:pPr>
-            <a:endParaRPr lang="nl-NL" dirty="0"/>
+            <a:endParaRPr lang="nl-NL" sz="500" dirty="0"/>
           </a:p>
           <a:p>
             <a:pPr marL="342900" indent="-342900">
@@ -7030,7 +7049,11 @@
             </a:r>
             <a:r>
               <a:rPr lang="nl-NL" dirty="0"/>
-              <a:t> Forward Euler</a:t>
+              <a:t> </a:t>
+            </a:r>
+            <a:r>
+              <a:rPr lang="nl-NL" i="1" dirty="0"/>
+              <a:t>Forward Euler</a:t>
             </a:r>
           </a:p>
         </p:txBody>
@@ -7051,8 +7074,8 @@
             </p:nvSpPr>
             <p:spPr>
               <a:xfrm>
-                <a:off x="1837189" y="3716323"/>
-                <a:ext cx="1459630" cy="1352165"/>
+                <a:off x="1828800" y="3878432"/>
+                <a:ext cx="1459630" cy="1799732"/>
               </a:xfrm>
               <a:prstGeom prst="rect">
                 <a:avLst/>
@@ -7330,8 +7353,8 @@
             </p:nvSpPr>
             <p:spPr>
               <a:xfrm>
-                <a:off x="1837189" y="3716323"/>
-                <a:ext cx="1459630" cy="1352165"/>
+                <a:off x="1828800" y="3878432"/>
+                <a:ext cx="1459630" cy="1799732"/>
               </a:xfrm>
               <a:prstGeom prst="rect">
                 <a:avLst/>
@@ -7339,7 +7362,7 @@
               <a:blipFill>
                 <a:blip r:embed="rId2"/>
                 <a:stretch>
-                  <a:fillRect l="-7500" t="-9050" b="-7240"/>
+                  <a:fillRect l="-7531" t="-6441"/>
                 </a:stretch>
               </a:blipFill>
             </p:spPr>
@@ -7557,6 +7580,41 @@
               <a:rPr lang="en-US" dirty="0"/>
               <a:t>- Jos Stam</a:t>
             </a:r>
+          </a:p>
+          <a:p>
+            <a:pPr marL="342900" indent="-342900">
+              <a:buFont typeface="Arial" panose="020B0604020202020204" pitchFamily="34" charset="0"/>
+              <a:buChar char="•"/>
+            </a:pPr>
+            <a:r>
+              <a:rPr lang="nl-NL" i="1" dirty="0"/>
+              <a:t>Visual </a:t>
+            </a:r>
+            <a:r>
+              <a:rPr lang="nl-NL" i="1" dirty="0" err="1"/>
+              <a:t>Simulation</a:t>
+            </a:r>
+            <a:r>
+              <a:rPr lang="nl-NL" i="1" dirty="0"/>
+              <a:t> of </a:t>
+            </a:r>
+            <a:r>
+              <a:rPr lang="nl-NL" i="1" dirty="0" err="1"/>
+              <a:t>Smoke</a:t>
+            </a:r>
+            <a:r>
+              <a:rPr lang="nl-NL" i="1" dirty="0"/>
+              <a:t> </a:t>
+            </a:r>
+            <a:r>
+              <a:rPr lang="nl-NL" dirty="0"/>
+              <a:t>- Ronald </a:t>
+            </a:r>
+            <a:r>
+              <a:rPr lang="nl-NL" dirty="0" err="1"/>
+              <a:t>Fedkiw</a:t>
+            </a:r>
+            <a:endParaRPr lang="en-US" dirty="0"/>
           </a:p>
           <a:p>
             <a:pPr marL="342900" indent="-342900">

</xml_diff>